<commit_message>
new Win11-related updates: Sch. jobs, Modules, Red team
</commit_message>
<xml_diff>
--- a/CYBER360-8.4-Red-Team.pptx
+++ b/CYBER360-8.4-Red-Team.pptx
@@ -147,317 +147,6 @@
 <file path=ppt/changesInfos/changesInfo1.xml><?xml version="1.0" encoding="utf-8"?>
 <pc:chgInfo xmlns:a="http://schemas.openxmlformats.org/drawingml/2006/main" xmlns:r="http://schemas.openxmlformats.org/officeDocument/2006/relationships" xmlns:ac="http://schemas.microsoft.com/office/drawing/2013/main/command" xmlns:pc="http://schemas.microsoft.com/office/powerpoint/2013/main/command">
   <pc:docChgLst>
-    <pc:chgData name="Gibbons, Carl" userId="d2b037bc-8fb4-4222-845c-61440543a456" providerId="ADAL" clId="{513A426B-8C0C-4739-8154-95FA52836484}"/>
-    <pc:docChg chg="custSel modSld">
-      <pc:chgData name="Gibbons, Carl" userId="d2b037bc-8fb4-4222-845c-61440543a456" providerId="ADAL" clId="{513A426B-8C0C-4739-8154-95FA52836484}" dt="2024-06-13T20:40:03.415" v="917" actId="20577"/>
-      <pc:docMkLst>
-        <pc:docMk/>
-      </pc:docMkLst>
-      <pc:sldChg chg="modSp mod">
-        <pc:chgData name="Gibbons, Carl" userId="d2b037bc-8fb4-4222-845c-61440543a456" providerId="ADAL" clId="{513A426B-8C0C-4739-8154-95FA52836484}" dt="2024-06-13T19:43:29.739" v="23" actId="20577"/>
-        <pc:sldMkLst>
-          <pc:docMk/>
-          <pc:sldMk cId="2611413137" sldId="266"/>
-        </pc:sldMkLst>
-        <pc:spChg chg="mod">
-          <ac:chgData name="Gibbons, Carl" userId="d2b037bc-8fb4-4222-845c-61440543a456" providerId="ADAL" clId="{513A426B-8C0C-4739-8154-95FA52836484}" dt="2024-06-13T19:43:29.739" v="23" actId="20577"/>
-          <ac:spMkLst>
-            <pc:docMk/>
-            <pc:sldMk cId="2611413137" sldId="266"/>
-            <ac:spMk id="2" creationId="{64492E64-A68B-8CA7-B3C6-044F7C8E76AB}"/>
-          </ac:spMkLst>
-        </pc:spChg>
-      </pc:sldChg>
-      <pc:sldChg chg="modSp mod">
-        <pc:chgData name="Gibbons, Carl" userId="d2b037bc-8fb4-4222-845c-61440543a456" providerId="ADAL" clId="{513A426B-8C0C-4739-8154-95FA52836484}" dt="2024-06-13T19:56:07.263" v="304" actId="20577"/>
-        <pc:sldMkLst>
-          <pc:docMk/>
-          <pc:sldMk cId="2022267737" sldId="268"/>
-        </pc:sldMkLst>
-        <pc:spChg chg="mod">
-          <ac:chgData name="Gibbons, Carl" userId="d2b037bc-8fb4-4222-845c-61440543a456" providerId="ADAL" clId="{513A426B-8C0C-4739-8154-95FA52836484}" dt="2024-06-13T19:56:07.263" v="304" actId="20577"/>
-          <ac:spMkLst>
-            <pc:docMk/>
-            <pc:sldMk cId="2022267737" sldId="268"/>
-            <ac:spMk id="4" creationId="{B64A8207-997F-319E-7F6D-676D3ECA779B}"/>
-          </ac:spMkLst>
-        </pc:spChg>
-      </pc:sldChg>
-      <pc:sldChg chg="modSp mod">
-        <pc:chgData name="Gibbons, Carl" userId="d2b037bc-8fb4-4222-845c-61440543a456" providerId="ADAL" clId="{513A426B-8C0C-4739-8154-95FA52836484}" dt="2024-06-13T19:59:09.439" v="305" actId="20577"/>
-        <pc:sldMkLst>
-          <pc:docMk/>
-          <pc:sldMk cId="1457658100" sldId="271"/>
-        </pc:sldMkLst>
-        <pc:spChg chg="mod">
-          <ac:chgData name="Gibbons, Carl" userId="d2b037bc-8fb4-4222-845c-61440543a456" providerId="ADAL" clId="{513A426B-8C0C-4739-8154-95FA52836484}" dt="2024-06-13T19:59:09.439" v="305" actId="20577"/>
-          <ac:spMkLst>
-            <pc:docMk/>
-            <pc:sldMk cId="1457658100" sldId="271"/>
-            <ac:spMk id="4" creationId="{B64A8207-997F-319E-7F6D-676D3ECA779B}"/>
-          </ac:spMkLst>
-        </pc:spChg>
-      </pc:sldChg>
-      <pc:sldChg chg="modSp mod">
-        <pc:chgData name="Gibbons, Carl" userId="d2b037bc-8fb4-4222-845c-61440543a456" providerId="ADAL" clId="{513A426B-8C0C-4739-8154-95FA52836484}" dt="2024-06-13T20:20:51.743" v="313" actId="20577"/>
-        <pc:sldMkLst>
-          <pc:docMk/>
-          <pc:sldMk cId="1865769485" sldId="273"/>
-        </pc:sldMkLst>
-        <pc:spChg chg="mod">
-          <ac:chgData name="Gibbons, Carl" userId="d2b037bc-8fb4-4222-845c-61440543a456" providerId="ADAL" clId="{513A426B-8C0C-4739-8154-95FA52836484}" dt="2024-06-13T20:20:51.743" v="313" actId="20577"/>
-          <ac:spMkLst>
-            <pc:docMk/>
-            <pc:sldMk cId="1865769485" sldId="273"/>
-            <ac:spMk id="4" creationId="{B64A8207-997F-319E-7F6D-676D3ECA779B}"/>
-          </ac:spMkLst>
-        </pc:spChg>
-      </pc:sldChg>
-      <pc:sldChg chg="modSp mod">
-        <pc:chgData name="Gibbons, Carl" userId="d2b037bc-8fb4-4222-845c-61440543a456" providerId="ADAL" clId="{513A426B-8C0C-4739-8154-95FA52836484}" dt="2024-06-13T20:28:48.315" v="352" actId="20577"/>
-        <pc:sldMkLst>
-          <pc:docMk/>
-          <pc:sldMk cId="3809967197" sldId="275"/>
-        </pc:sldMkLst>
-        <pc:spChg chg="mod">
-          <ac:chgData name="Gibbons, Carl" userId="d2b037bc-8fb4-4222-845c-61440543a456" providerId="ADAL" clId="{513A426B-8C0C-4739-8154-95FA52836484}" dt="2024-06-13T20:28:48.315" v="352" actId="20577"/>
-          <ac:spMkLst>
-            <pc:docMk/>
-            <pc:sldMk cId="3809967197" sldId="275"/>
-            <ac:spMk id="3" creationId="{ADD8957C-88E6-A920-4979-2BDA9406B518}"/>
-          </ac:spMkLst>
-        </pc:spChg>
-      </pc:sldChg>
-      <pc:sldChg chg="modSp mod">
-        <pc:chgData name="Gibbons, Carl" userId="d2b037bc-8fb4-4222-845c-61440543a456" providerId="ADAL" clId="{513A426B-8C0C-4739-8154-95FA52836484}" dt="2024-06-13T20:40:03.415" v="917" actId="20577"/>
-        <pc:sldMkLst>
-          <pc:docMk/>
-          <pc:sldMk cId="1742169507" sldId="276"/>
-        </pc:sldMkLst>
-        <pc:spChg chg="mod">
-          <ac:chgData name="Gibbons, Carl" userId="d2b037bc-8fb4-4222-845c-61440543a456" providerId="ADAL" clId="{513A426B-8C0C-4739-8154-95FA52836484}" dt="2024-06-13T20:40:03.415" v="917" actId="20577"/>
-          <ac:spMkLst>
-            <pc:docMk/>
-            <pc:sldMk cId="1742169507" sldId="276"/>
-            <ac:spMk id="3" creationId="{ADD8957C-88E6-A920-4979-2BDA9406B518}"/>
-          </ac:spMkLst>
-        </pc:spChg>
-      </pc:sldChg>
-    </pc:docChg>
-  </pc:docChgLst>
-  <pc:docChgLst>
-    <pc:chgData name="Gibbons, Carl" userId="d2b037bc-8fb4-4222-845c-61440543a456" providerId="ADAL" clId="{26C7F00A-80DD-401B-832B-E7EF202E28C2}"/>
-    <pc:docChg chg="undo custSel addSld delSld modSld">
-      <pc:chgData name="Gibbons, Carl" userId="d2b037bc-8fb4-4222-845c-61440543a456" providerId="ADAL" clId="{26C7F00A-80DD-401B-832B-E7EF202E28C2}" dt="2024-06-14T04:25:56.561" v="6285" actId="20577"/>
-      <pc:docMkLst>
-        <pc:docMk/>
-      </pc:docMkLst>
-      <pc:sldChg chg="modSp mod">
-        <pc:chgData name="Gibbons, Carl" userId="d2b037bc-8fb4-4222-845c-61440543a456" providerId="ADAL" clId="{26C7F00A-80DD-401B-832B-E7EF202E28C2}" dt="2024-06-14T03:01:29.413" v="72" actId="20577"/>
-        <pc:sldMkLst>
-          <pc:docMk/>
-          <pc:sldMk cId="3644072983" sldId="256"/>
-        </pc:sldMkLst>
-        <pc:spChg chg="mod">
-          <ac:chgData name="Gibbons, Carl" userId="d2b037bc-8fb4-4222-845c-61440543a456" providerId="ADAL" clId="{26C7F00A-80DD-401B-832B-E7EF202E28C2}" dt="2024-06-14T03:01:29.413" v="72" actId="20577"/>
-          <ac:spMkLst>
-            <pc:docMk/>
-            <pc:sldMk cId="3644072983" sldId="256"/>
-            <ac:spMk id="3" creationId="{8586CD17-5B17-5D66-987C-05DC748B3FF9}"/>
-          </ac:spMkLst>
-        </pc:spChg>
-      </pc:sldChg>
-      <pc:sldChg chg="addSp modSp mod">
-        <pc:chgData name="Gibbons, Carl" userId="d2b037bc-8fb4-4222-845c-61440543a456" providerId="ADAL" clId="{26C7F00A-80DD-401B-832B-E7EF202E28C2}" dt="2024-06-14T04:16:37.203" v="6124" actId="20577"/>
-        <pc:sldMkLst>
-          <pc:docMk/>
-          <pc:sldMk cId="2611413137" sldId="266"/>
-        </pc:sldMkLst>
-        <pc:spChg chg="mod">
-          <ac:chgData name="Gibbons, Carl" userId="d2b037bc-8fb4-4222-845c-61440543a456" providerId="ADAL" clId="{26C7F00A-80DD-401B-832B-E7EF202E28C2}" dt="2024-06-14T03:02:13.298" v="116" actId="20577"/>
-          <ac:spMkLst>
-            <pc:docMk/>
-            <pc:sldMk cId="2611413137" sldId="266"/>
-            <ac:spMk id="2" creationId="{64492E64-A68B-8CA7-B3C6-044F7C8E76AB}"/>
-          </ac:spMkLst>
-        </pc:spChg>
-        <pc:spChg chg="add mod">
-          <ac:chgData name="Gibbons, Carl" userId="d2b037bc-8fb4-4222-845c-61440543a456" providerId="ADAL" clId="{26C7F00A-80DD-401B-832B-E7EF202E28C2}" dt="2024-06-14T04:16:06.804" v="6121" actId="20577"/>
-          <ac:spMkLst>
-            <pc:docMk/>
-            <pc:sldMk cId="2611413137" sldId="266"/>
-            <ac:spMk id="3" creationId="{20E8B8C0-A2A5-7B62-1B40-D3BF6CA80A5C}"/>
-          </ac:spMkLst>
-        </pc:spChg>
-        <pc:spChg chg="mod">
-          <ac:chgData name="Gibbons, Carl" userId="d2b037bc-8fb4-4222-845c-61440543a456" providerId="ADAL" clId="{26C7F00A-80DD-401B-832B-E7EF202E28C2}" dt="2024-06-14T04:13:37.754" v="6102" actId="20577"/>
-          <ac:spMkLst>
-            <pc:docMk/>
-            <pc:sldMk cId="2611413137" sldId="266"/>
-            <ac:spMk id="4" creationId="{B64A8207-997F-319E-7F6D-676D3ECA779B}"/>
-          </ac:spMkLst>
-        </pc:spChg>
-        <pc:spChg chg="add mod">
-          <ac:chgData name="Gibbons, Carl" userId="d2b037bc-8fb4-4222-845c-61440543a456" providerId="ADAL" clId="{26C7F00A-80DD-401B-832B-E7EF202E28C2}" dt="2024-06-14T04:16:37.203" v="6124" actId="20577"/>
-          <ac:spMkLst>
-            <pc:docMk/>
-            <pc:sldMk cId="2611413137" sldId="266"/>
-            <ac:spMk id="5" creationId="{EDDCCECA-E971-2EC4-FEF0-DCF50F49CE6A}"/>
-          </ac:spMkLst>
-        </pc:spChg>
-        <pc:spChg chg="add mod">
-          <ac:chgData name="Gibbons, Carl" userId="d2b037bc-8fb4-4222-845c-61440543a456" providerId="ADAL" clId="{26C7F00A-80DD-401B-832B-E7EF202E28C2}" dt="2024-06-14T04:12:29.809" v="6069" actId="1076"/>
-          <ac:spMkLst>
-            <pc:docMk/>
-            <pc:sldMk cId="2611413137" sldId="266"/>
-            <ac:spMk id="6" creationId="{BAACEC6C-4A35-E101-5EBD-12F9722B023B}"/>
-          </ac:spMkLst>
-        </pc:spChg>
-      </pc:sldChg>
-      <pc:sldChg chg="modSp mod">
-        <pc:chgData name="Gibbons, Carl" userId="d2b037bc-8fb4-4222-845c-61440543a456" providerId="ADAL" clId="{26C7F00A-80DD-401B-832B-E7EF202E28C2}" dt="2024-06-14T03:45:35.713" v="3519" actId="20577"/>
-        <pc:sldMkLst>
-          <pc:docMk/>
-          <pc:sldMk cId="4188996306" sldId="267"/>
-        </pc:sldMkLst>
-        <pc:spChg chg="mod">
-          <ac:chgData name="Gibbons, Carl" userId="d2b037bc-8fb4-4222-845c-61440543a456" providerId="ADAL" clId="{26C7F00A-80DD-401B-832B-E7EF202E28C2}" dt="2024-06-14T03:32:32.285" v="2957" actId="20577"/>
-          <ac:spMkLst>
-            <pc:docMk/>
-            <pc:sldMk cId="4188996306" sldId="267"/>
-            <ac:spMk id="2" creationId="{64492E64-A68B-8CA7-B3C6-044F7C8E76AB}"/>
-          </ac:spMkLst>
-        </pc:spChg>
-        <pc:spChg chg="mod">
-          <ac:chgData name="Gibbons, Carl" userId="d2b037bc-8fb4-4222-845c-61440543a456" providerId="ADAL" clId="{26C7F00A-80DD-401B-832B-E7EF202E28C2}" dt="2024-06-14T03:45:35.713" v="3519" actId="20577"/>
-          <ac:spMkLst>
-            <pc:docMk/>
-            <pc:sldMk cId="4188996306" sldId="267"/>
-            <ac:spMk id="4" creationId="{B64A8207-997F-319E-7F6D-676D3ECA779B}"/>
-          </ac:spMkLst>
-        </pc:spChg>
-      </pc:sldChg>
-      <pc:sldChg chg="del">
-        <pc:chgData name="Gibbons, Carl" userId="d2b037bc-8fb4-4222-845c-61440543a456" providerId="ADAL" clId="{26C7F00A-80DD-401B-832B-E7EF202E28C2}" dt="2024-06-14T03:32:17.349" v="2943" actId="47"/>
-        <pc:sldMkLst>
-          <pc:docMk/>
-          <pc:sldMk cId="2948456625" sldId="277"/>
-        </pc:sldMkLst>
-      </pc:sldChg>
-      <pc:sldChg chg="del">
-        <pc:chgData name="Gibbons, Carl" userId="d2b037bc-8fb4-4222-845c-61440543a456" providerId="ADAL" clId="{26C7F00A-80DD-401B-832B-E7EF202E28C2}" dt="2024-06-14T03:02:04.454" v="73" actId="47"/>
-        <pc:sldMkLst>
-          <pc:docMk/>
-          <pc:sldMk cId="102374663" sldId="278"/>
-        </pc:sldMkLst>
-      </pc:sldChg>
-      <pc:sldChg chg="del">
-        <pc:chgData name="Gibbons, Carl" userId="d2b037bc-8fb4-4222-845c-61440543a456" providerId="ADAL" clId="{26C7F00A-80DD-401B-832B-E7EF202E28C2}" dt="2024-06-14T03:53:53.417" v="4260" actId="47"/>
-        <pc:sldMkLst>
-          <pc:docMk/>
-          <pc:sldMk cId="1709941748" sldId="279"/>
-        </pc:sldMkLst>
-      </pc:sldChg>
-      <pc:sldChg chg="del">
-        <pc:chgData name="Gibbons, Carl" userId="d2b037bc-8fb4-4222-845c-61440543a456" providerId="ADAL" clId="{26C7F00A-80DD-401B-832B-E7EF202E28C2}" dt="2024-06-14T03:53:50.044" v="4259" actId="47"/>
-        <pc:sldMkLst>
-          <pc:docMk/>
-          <pc:sldMk cId="4176796158" sldId="280"/>
-        </pc:sldMkLst>
-      </pc:sldChg>
-      <pc:sldChg chg="del">
-        <pc:chgData name="Gibbons, Carl" userId="d2b037bc-8fb4-4222-845c-61440543a456" providerId="ADAL" clId="{26C7F00A-80DD-401B-832B-E7EF202E28C2}" dt="2024-06-14T03:53:48.385" v="4257" actId="47"/>
-        <pc:sldMkLst>
-          <pc:docMk/>
-          <pc:sldMk cId="3311622519" sldId="281"/>
-        </pc:sldMkLst>
-      </pc:sldChg>
-      <pc:sldChg chg="del">
-        <pc:chgData name="Gibbons, Carl" userId="d2b037bc-8fb4-4222-845c-61440543a456" providerId="ADAL" clId="{26C7F00A-80DD-401B-832B-E7EF202E28C2}" dt="2024-06-14T03:53:49.242" v="4258" actId="47"/>
-        <pc:sldMkLst>
-          <pc:docMk/>
-          <pc:sldMk cId="4163349812" sldId="282"/>
-        </pc:sldMkLst>
-      </pc:sldChg>
-      <pc:sldChg chg="del">
-        <pc:chgData name="Gibbons, Carl" userId="d2b037bc-8fb4-4222-845c-61440543a456" providerId="ADAL" clId="{26C7F00A-80DD-401B-832B-E7EF202E28C2}" dt="2024-06-14T03:53:47.016" v="4256" actId="47"/>
-        <pc:sldMkLst>
-          <pc:docMk/>
-          <pc:sldMk cId="2755793427" sldId="283"/>
-        </pc:sldMkLst>
-      </pc:sldChg>
-      <pc:sldChg chg="modSp mod">
-        <pc:chgData name="Gibbons, Carl" userId="d2b037bc-8fb4-4222-845c-61440543a456" providerId="ADAL" clId="{26C7F00A-80DD-401B-832B-E7EF202E28C2}" dt="2024-06-14T04:20:29.253" v="6160" actId="20577"/>
-        <pc:sldMkLst>
-          <pc:docMk/>
-          <pc:sldMk cId="322366662" sldId="284"/>
-        </pc:sldMkLst>
-        <pc:spChg chg="mod">
-          <ac:chgData name="Gibbons, Carl" userId="d2b037bc-8fb4-4222-845c-61440543a456" providerId="ADAL" clId="{26C7F00A-80DD-401B-832B-E7EF202E28C2}" dt="2024-06-14T04:10:42.746" v="6042" actId="20577"/>
-          <ac:spMkLst>
-            <pc:docMk/>
-            <pc:sldMk cId="322366662" sldId="284"/>
-            <ac:spMk id="2" creationId="{64492E64-A68B-8CA7-B3C6-044F7C8E76AB}"/>
-          </ac:spMkLst>
-        </pc:spChg>
-        <pc:spChg chg="mod">
-          <ac:chgData name="Gibbons, Carl" userId="d2b037bc-8fb4-4222-845c-61440543a456" providerId="ADAL" clId="{26C7F00A-80DD-401B-832B-E7EF202E28C2}" dt="2024-06-14T04:20:29.253" v="6160" actId="20577"/>
-          <ac:spMkLst>
-            <pc:docMk/>
-            <pc:sldMk cId="322366662" sldId="284"/>
-            <ac:spMk id="4" creationId="{B64A8207-997F-319E-7F6D-676D3ECA779B}"/>
-          </ac:spMkLst>
-        </pc:spChg>
-      </pc:sldChg>
-      <pc:sldChg chg="modSp add mod">
-        <pc:chgData name="Gibbons, Carl" userId="d2b037bc-8fb4-4222-845c-61440543a456" providerId="ADAL" clId="{26C7F00A-80DD-401B-832B-E7EF202E28C2}" dt="2024-06-14T04:25:56.561" v="6285" actId="20577"/>
-        <pc:sldMkLst>
-          <pc:docMk/>
-          <pc:sldMk cId="2432840855" sldId="285"/>
-        </pc:sldMkLst>
-        <pc:spChg chg="mod">
-          <ac:chgData name="Gibbons, Carl" userId="d2b037bc-8fb4-4222-845c-61440543a456" providerId="ADAL" clId="{26C7F00A-80DD-401B-832B-E7EF202E28C2}" dt="2024-06-14T03:44:30.748" v="3459" actId="20577"/>
-          <ac:spMkLst>
-            <pc:docMk/>
-            <pc:sldMk cId="2432840855" sldId="285"/>
-            <ac:spMk id="2" creationId="{64492E64-A68B-8CA7-B3C6-044F7C8E76AB}"/>
-          </ac:spMkLst>
-        </pc:spChg>
-        <pc:spChg chg="mod">
-          <ac:chgData name="Gibbons, Carl" userId="d2b037bc-8fb4-4222-845c-61440543a456" providerId="ADAL" clId="{26C7F00A-80DD-401B-832B-E7EF202E28C2}" dt="2024-06-14T04:25:56.561" v="6285" actId="20577"/>
-          <ac:spMkLst>
-            <pc:docMk/>
-            <pc:sldMk cId="2432840855" sldId="285"/>
-            <ac:spMk id="4" creationId="{B64A8207-997F-319E-7F6D-676D3ECA779B}"/>
-          </ac:spMkLst>
-        </pc:spChg>
-      </pc:sldChg>
-      <pc:sldChg chg="modSp add mod">
-        <pc:chgData name="Gibbons, Carl" userId="d2b037bc-8fb4-4222-845c-61440543a456" providerId="ADAL" clId="{26C7F00A-80DD-401B-832B-E7EF202E28C2}" dt="2024-06-14T04:24:44.734" v="6236" actId="20577"/>
-        <pc:sldMkLst>
-          <pc:docMk/>
-          <pc:sldMk cId="2169521787" sldId="286"/>
-        </pc:sldMkLst>
-        <pc:spChg chg="mod">
-          <ac:chgData name="Gibbons, Carl" userId="d2b037bc-8fb4-4222-845c-61440543a456" providerId="ADAL" clId="{26C7F00A-80DD-401B-832B-E7EF202E28C2}" dt="2024-06-14T03:53:36.567" v="4255" actId="20577"/>
-          <ac:spMkLst>
-            <pc:docMk/>
-            <pc:sldMk cId="2169521787" sldId="286"/>
-            <ac:spMk id="2" creationId="{64492E64-A68B-8CA7-B3C6-044F7C8E76AB}"/>
-          </ac:spMkLst>
-        </pc:spChg>
-        <pc:spChg chg="mod">
-          <ac:chgData name="Gibbons, Carl" userId="d2b037bc-8fb4-4222-845c-61440543a456" providerId="ADAL" clId="{26C7F00A-80DD-401B-832B-E7EF202E28C2}" dt="2024-06-14T04:24:44.734" v="6236" actId="20577"/>
-          <ac:spMkLst>
-            <pc:docMk/>
-            <pc:sldMk cId="2169521787" sldId="286"/>
-            <ac:spMk id="4" creationId="{B64A8207-997F-319E-7F6D-676D3ECA779B}"/>
-          </ac:spMkLst>
-        </pc:spChg>
-      </pc:sldChg>
-    </pc:docChg>
-  </pc:docChgLst>
-  <pc:docChgLst>
     <pc:chgData name="Gibbons, Carl" userId="d2b037bc-8fb4-4222-845c-61440543a456" providerId="ADAL" clId="{B1B76948-CF5F-4A89-ADB0-7515E617BB90}"/>
     <pc:docChg chg="delSld modSld">
       <pc:chgData name="Gibbons, Carl" userId="d2b037bc-8fb4-4222-845c-61440543a456" providerId="ADAL" clId="{B1B76948-CF5F-4A89-ADB0-7515E617BB90}" dt="2024-06-25T12:33:24.787" v="198" actId="20577"/>
@@ -854,6 +543,30 @@
     </pc:docChg>
   </pc:docChgLst>
   <pc:docChgLst>
+    <pc:chgData name="Gibbons, Carl" userId="d2b037bc-8fb4-4222-845c-61440543a456" providerId="ADAL" clId="{ACF90228-EFF2-4732-BE47-2165A82AAC55}"/>
+    <pc:docChg chg="modSld">
+      <pc:chgData name="Gibbons, Carl" userId="d2b037bc-8fb4-4222-845c-61440543a456" providerId="ADAL" clId="{ACF90228-EFF2-4732-BE47-2165A82AAC55}" dt="2024-01-09T21:29:00.955" v="0"/>
+      <pc:docMkLst>
+        <pc:docMk/>
+      </pc:docMkLst>
+      <pc:sldChg chg="modSp mod">
+        <pc:chgData name="Gibbons, Carl" userId="d2b037bc-8fb4-4222-845c-61440543a456" providerId="ADAL" clId="{ACF90228-EFF2-4732-BE47-2165A82AAC55}" dt="2024-01-09T21:29:00.955" v="0"/>
+        <pc:sldMkLst>
+          <pc:docMk/>
+          <pc:sldMk cId="1055206713" sldId="269"/>
+        </pc:sldMkLst>
+        <pc:spChg chg="mod">
+          <ac:chgData name="Gibbons, Carl" userId="d2b037bc-8fb4-4222-845c-61440543a456" providerId="ADAL" clId="{ACF90228-EFF2-4732-BE47-2165A82AAC55}" dt="2024-01-09T21:29:00.955" v="0"/>
+          <ac:spMkLst>
+            <pc:docMk/>
+            <pc:sldMk cId="1055206713" sldId="269"/>
+            <ac:spMk id="4" creationId="{B64A8207-997F-319E-7F6D-676D3ECA779B}"/>
+          </ac:spMkLst>
+        </pc:spChg>
+      </pc:sldChg>
+    </pc:docChg>
+  </pc:docChgLst>
+  <pc:docChgLst>
     <pc:chgData name="Gibbons, Carl" userId="d2b037bc-8fb4-4222-845c-61440543a456" providerId="ADAL" clId="{50BDE464-6684-48FF-AD2A-493B60EFD46B}"/>
     <pc:docChg chg="modSld">
       <pc:chgData name="Gibbons, Carl" userId="d2b037bc-8fb4-4222-845c-61440543a456" providerId="ADAL" clId="{50BDE464-6684-48FF-AD2A-493B60EFD46B}" dt="2023-12-21T18:37:59.974" v="91" actId="20577"/>
@@ -908,24 +621,168 @@
     </pc:docChg>
   </pc:docChgLst>
   <pc:docChgLst>
-    <pc:chgData name="Gibbons, Carl" userId="d2b037bc-8fb4-4222-845c-61440543a456" providerId="ADAL" clId="{ACF90228-EFF2-4732-BE47-2165A82AAC55}"/>
+    <pc:chgData name="Gibbons, Carl" userId="d2b037bc-8fb4-4222-845c-61440543a456" providerId="ADAL" clId="{DD1CE632-2E50-4DF6-A094-0B92632EBA8E}"/>
     <pc:docChg chg="modSld">
-      <pc:chgData name="Gibbons, Carl" userId="d2b037bc-8fb4-4222-845c-61440543a456" providerId="ADAL" clId="{ACF90228-EFF2-4732-BE47-2165A82AAC55}" dt="2024-01-09T21:29:00.955" v="0"/>
+      <pc:chgData name="Gibbons, Carl" userId="d2b037bc-8fb4-4222-845c-61440543a456" providerId="ADAL" clId="{DD1CE632-2E50-4DF6-A094-0B92632EBA8E}" dt="2023-12-06T17:42:28.848" v="23" actId="20577"/>
       <pc:docMkLst>
         <pc:docMk/>
       </pc:docMkLst>
       <pc:sldChg chg="modSp mod">
-        <pc:chgData name="Gibbons, Carl" userId="d2b037bc-8fb4-4222-845c-61440543a456" providerId="ADAL" clId="{ACF90228-EFF2-4732-BE47-2165A82AAC55}" dt="2024-01-09T21:29:00.955" v="0"/>
+        <pc:chgData name="Gibbons, Carl" userId="d2b037bc-8fb4-4222-845c-61440543a456" providerId="ADAL" clId="{DD1CE632-2E50-4DF6-A094-0B92632EBA8E}" dt="2023-11-21T08:38:02.899" v="11" actId="20577"/>
         <pc:sldMkLst>
           <pc:docMk/>
-          <pc:sldMk cId="1055206713" sldId="269"/>
+          <pc:sldMk cId="3594981681" sldId="272"/>
         </pc:sldMkLst>
         <pc:spChg chg="mod">
-          <ac:chgData name="Gibbons, Carl" userId="d2b037bc-8fb4-4222-845c-61440543a456" providerId="ADAL" clId="{ACF90228-EFF2-4732-BE47-2165A82AAC55}" dt="2024-01-09T21:29:00.955" v="0"/>
-          <ac:spMkLst>
-            <pc:docMk/>
-            <pc:sldMk cId="1055206713" sldId="269"/>
+          <ac:chgData name="Gibbons, Carl" userId="d2b037bc-8fb4-4222-845c-61440543a456" providerId="ADAL" clId="{DD1CE632-2E50-4DF6-A094-0B92632EBA8E}" dt="2023-11-21T08:38:02.899" v="11" actId="20577"/>
+          <ac:spMkLst>
+            <pc:docMk/>
+            <pc:sldMk cId="3594981681" sldId="272"/>
             <ac:spMk id="4" creationId="{B64A8207-997F-319E-7F6D-676D3ECA779B}"/>
+          </ac:spMkLst>
+        </pc:spChg>
+      </pc:sldChg>
+      <pc:sldChg chg="modSp mod">
+        <pc:chgData name="Gibbons, Carl" userId="d2b037bc-8fb4-4222-845c-61440543a456" providerId="ADAL" clId="{DD1CE632-2E50-4DF6-A094-0B92632EBA8E}" dt="2023-12-06T17:42:28.848" v="23" actId="20577"/>
+        <pc:sldMkLst>
+          <pc:docMk/>
+          <pc:sldMk cId="1865769485" sldId="273"/>
+        </pc:sldMkLst>
+        <pc:spChg chg="mod">
+          <ac:chgData name="Gibbons, Carl" userId="d2b037bc-8fb4-4222-845c-61440543a456" providerId="ADAL" clId="{DD1CE632-2E50-4DF6-A094-0B92632EBA8E}" dt="2023-12-06T17:42:28.848" v="23" actId="20577"/>
+          <ac:spMkLst>
+            <pc:docMk/>
+            <pc:sldMk cId="1865769485" sldId="273"/>
+            <ac:spMk id="4" creationId="{B64A8207-997F-319E-7F6D-676D3ECA779B}"/>
+          </ac:spMkLst>
+        </pc:spChg>
+      </pc:sldChg>
+      <pc:sldChg chg="modSp mod">
+        <pc:chgData name="Gibbons, Carl" userId="d2b037bc-8fb4-4222-845c-61440543a456" providerId="ADAL" clId="{DD1CE632-2E50-4DF6-A094-0B92632EBA8E}" dt="2023-12-06T17:39:43.190" v="12" actId="20577"/>
+        <pc:sldMkLst>
+          <pc:docMk/>
+          <pc:sldMk cId="3809967197" sldId="275"/>
+        </pc:sldMkLst>
+        <pc:spChg chg="mod">
+          <ac:chgData name="Gibbons, Carl" userId="d2b037bc-8fb4-4222-845c-61440543a456" providerId="ADAL" clId="{DD1CE632-2E50-4DF6-A094-0B92632EBA8E}" dt="2023-12-06T17:39:43.190" v="12" actId="20577"/>
+          <ac:spMkLst>
+            <pc:docMk/>
+            <pc:sldMk cId="3809967197" sldId="275"/>
+            <ac:spMk id="3" creationId="{ADD8957C-88E6-A920-4979-2BDA9406B518}"/>
+          </ac:spMkLst>
+        </pc:spChg>
+      </pc:sldChg>
+      <pc:sldChg chg="modSp mod">
+        <pc:chgData name="Gibbons, Carl" userId="d2b037bc-8fb4-4222-845c-61440543a456" providerId="ADAL" clId="{DD1CE632-2E50-4DF6-A094-0B92632EBA8E}" dt="2023-12-06T17:40:27.333" v="15" actId="20577"/>
+        <pc:sldMkLst>
+          <pc:docMk/>
+          <pc:sldMk cId="1742169507" sldId="276"/>
+        </pc:sldMkLst>
+        <pc:spChg chg="mod">
+          <ac:chgData name="Gibbons, Carl" userId="d2b037bc-8fb4-4222-845c-61440543a456" providerId="ADAL" clId="{DD1CE632-2E50-4DF6-A094-0B92632EBA8E}" dt="2023-12-06T17:40:27.333" v="15" actId="20577"/>
+          <ac:spMkLst>
+            <pc:docMk/>
+            <pc:sldMk cId="1742169507" sldId="276"/>
+            <ac:spMk id="3" creationId="{ADD8957C-88E6-A920-4979-2BDA9406B518}"/>
+          </ac:spMkLst>
+        </pc:spChg>
+      </pc:sldChg>
+    </pc:docChg>
+  </pc:docChgLst>
+  <pc:docChgLst>
+    <pc:chgData name="Gibbons, Carl" userId="d2b037bc-8fb4-4222-845c-61440543a456" providerId="ADAL" clId="{513A426B-8C0C-4739-8154-95FA52836484}"/>
+    <pc:docChg chg="custSel modSld">
+      <pc:chgData name="Gibbons, Carl" userId="d2b037bc-8fb4-4222-845c-61440543a456" providerId="ADAL" clId="{513A426B-8C0C-4739-8154-95FA52836484}" dt="2024-06-13T20:40:03.415" v="917" actId="20577"/>
+      <pc:docMkLst>
+        <pc:docMk/>
+      </pc:docMkLst>
+      <pc:sldChg chg="modSp mod">
+        <pc:chgData name="Gibbons, Carl" userId="d2b037bc-8fb4-4222-845c-61440543a456" providerId="ADAL" clId="{513A426B-8C0C-4739-8154-95FA52836484}" dt="2024-06-13T19:43:29.739" v="23" actId="20577"/>
+        <pc:sldMkLst>
+          <pc:docMk/>
+          <pc:sldMk cId="2611413137" sldId="266"/>
+        </pc:sldMkLst>
+        <pc:spChg chg="mod">
+          <ac:chgData name="Gibbons, Carl" userId="d2b037bc-8fb4-4222-845c-61440543a456" providerId="ADAL" clId="{513A426B-8C0C-4739-8154-95FA52836484}" dt="2024-06-13T19:43:29.739" v="23" actId="20577"/>
+          <ac:spMkLst>
+            <pc:docMk/>
+            <pc:sldMk cId="2611413137" sldId="266"/>
+            <ac:spMk id="2" creationId="{64492E64-A68B-8CA7-B3C6-044F7C8E76AB}"/>
+          </ac:spMkLst>
+        </pc:spChg>
+      </pc:sldChg>
+      <pc:sldChg chg="modSp mod">
+        <pc:chgData name="Gibbons, Carl" userId="d2b037bc-8fb4-4222-845c-61440543a456" providerId="ADAL" clId="{513A426B-8C0C-4739-8154-95FA52836484}" dt="2024-06-13T19:56:07.263" v="304" actId="20577"/>
+        <pc:sldMkLst>
+          <pc:docMk/>
+          <pc:sldMk cId="2022267737" sldId="268"/>
+        </pc:sldMkLst>
+        <pc:spChg chg="mod">
+          <ac:chgData name="Gibbons, Carl" userId="d2b037bc-8fb4-4222-845c-61440543a456" providerId="ADAL" clId="{513A426B-8C0C-4739-8154-95FA52836484}" dt="2024-06-13T19:56:07.263" v="304" actId="20577"/>
+          <ac:spMkLst>
+            <pc:docMk/>
+            <pc:sldMk cId="2022267737" sldId="268"/>
+            <ac:spMk id="4" creationId="{B64A8207-997F-319E-7F6D-676D3ECA779B}"/>
+          </ac:spMkLst>
+        </pc:spChg>
+      </pc:sldChg>
+      <pc:sldChg chg="modSp mod">
+        <pc:chgData name="Gibbons, Carl" userId="d2b037bc-8fb4-4222-845c-61440543a456" providerId="ADAL" clId="{513A426B-8C0C-4739-8154-95FA52836484}" dt="2024-06-13T19:59:09.439" v="305" actId="20577"/>
+        <pc:sldMkLst>
+          <pc:docMk/>
+          <pc:sldMk cId="1457658100" sldId="271"/>
+        </pc:sldMkLst>
+        <pc:spChg chg="mod">
+          <ac:chgData name="Gibbons, Carl" userId="d2b037bc-8fb4-4222-845c-61440543a456" providerId="ADAL" clId="{513A426B-8C0C-4739-8154-95FA52836484}" dt="2024-06-13T19:59:09.439" v="305" actId="20577"/>
+          <ac:spMkLst>
+            <pc:docMk/>
+            <pc:sldMk cId="1457658100" sldId="271"/>
+            <ac:spMk id="4" creationId="{B64A8207-997F-319E-7F6D-676D3ECA779B}"/>
+          </ac:spMkLst>
+        </pc:spChg>
+      </pc:sldChg>
+      <pc:sldChg chg="modSp mod">
+        <pc:chgData name="Gibbons, Carl" userId="d2b037bc-8fb4-4222-845c-61440543a456" providerId="ADAL" clId="{513A426B-8C0C-4739-8154-95FA52836484}" dt="2024-06-13T20:20:51.743" v="313" actId="20577"/>
+        <pc:sldMkLst>
+          <pc:docMk/>
+          <pc:sldMk cId="1865769485" sldId="273"/>
+        </pc:sldMkLst>
+        <pc:spChg chg="mod">
+          <ac:chgData name="Gibbons, Carl" userId="d2b037bc-8fb4-4222-845c-61440543a456" providerId="ADAL" clId="{513A426B-8C0C-4739-8154-95FA52836484}" dt="2024-06-13T20:20:51.743" v="313" actId="20577"/>
+          <ac:spMkLst>
+            <pc:docMk/>
+            <pc:sldMk cId="1865769485" sldId="273"/>
+            <ac:spMk id="4" creationId="{B64A8207-997F-319E-7F6D-676D3ECA779B}"/>
+          </ac:spMkLst>
+        </pc:spChg>
+      </pc:sldChg>
+      <pc:sldChg chg="modSp mod">
+        <pc:chgData name="Gibbons, Carl" userId="d2b037bc-8fb4-4222-845c-61440543a456" providerId="ADAL" clId="{513A426B-8C0C-4739-8154-95FA52836484}" dt="2024-06-13T20:28:48.315" v="352" actId="20577"/>
+        <pc:sldMkLst>
+          <pc:docMk/>
+          <pc:sldMk cId="3809967197" sldId="275"/>
+        </pc:sldMkLst>
+        <pc:spChg chg="mod">
+          <ac:chgData name="Gibbons, Carl" userId="d2b037bc-8fb4-4222-845c-61440543a456" providerId="ADAL" clId="{513A426B-8C0C-4739-8154-95FA52836484}" dt="2024-06-13T20:28:48.315" v="352" actId="20577"/>
+          <ac:spMkLst>
+            <pc:docMk/>
+            <pc:sldMk cId="3809967197" sldId="275"/>
+            <ac:spMk id="3" creationId="{ADD8957C-88E6-A920-4979-2BDA9406B518}"/>
+          </ac:spMkLst>
+        </pc:spChg>
+      </pc:sldChg>
+      <pc:sldChg chg="modSp mod">
+        <pc:chgData name="Gibbons, Carl" userId="d2b037bc-8fb4-4222-845c-61440543a456" providerId="ADAL" clId="{513A426B-8C0C-4739-8154-95FA52836484}" dt="2024-06-13T20:40:03.415" v="917" actId="20577"/>
+        <pc:sldMkLst>
+          <pc:docMk/>
+          <pc:sldMk cId="1742169507" sldId="276"/>
+        </pc:sldMkLst>
+        <pc:spChg chg="mod">
+          <ac:chgData name="Gibbons, Carl" userId="d2b037bc-8fb4-4222-845c-61440543a456" providerId="ADAL" clId="{513A426B-8C0C-4739-8154-95FA52836484}" dt="2024-06-13T20:40:03.415" v="917" actId="20577"/>
+          <ac:spMkLst>
+            <pc:docMk/>
+            <pc:sldMk cId="1742169507" sldId="276"/>
+            <ac:spMk id="3" creationId="{ADD8957C-88E6-A920-4979-2BDA9406B518}"/>
           </ac:spMkLst>
         </pc:spChg>
       </pc:sldChg>
@@ -1274,69 +1131,212 @@
     </pc:docChg>
   </pc:docChgLst>
   <pc:docChgLst>
-    <pc:chgData name="Gibbons, Carl" userId="d2b037bc-8fb4-4222-845c-61440543a456" providerId="ADAL" clId="{DD1CE632-2E50-4DF6-A094-0B92632EBA8E}"/>
-    <pc:docChg chg="modSld">
-      <pc:chgData name="Gibbons, Carl" userId="d2b037bc-8fb4-4222-845c-61440543a456" providerId="ADAL" clId="{DD1CE632-2E50-4DF6-A094-0B92632EBA8E}" dt="2023-12-06T17:42:28.848" v="23" actId="20577"/>
+    <pc:chgData name="Gibbons, Carl" userId="d2b037bc-8fb4-4222-845c-61440543a456" providerId="ADAL" clId="{26C7F00A-80DD-401B-832B-E7EF202E28C2}"/>
+    <pc:docChg chg="undo custSel addSld delSld modSld">
+      <pc:chgData name="Gibbons, Carl" userId="d2b037bc-8fb4-4222-845c-61440543a456" providerId="ADAL" clId="{26C7F00A-80DD-401B-832B-E7EF202E28C2}" dt="2024-06-14T04:25:56.561" v="6285" actId="20577"/>
       <pc:docMkLst>
         <pc:docMk/>
       </pc:docMkLst>
       <pc:sldChg chg="modSp mod">
-        <pc:chgData name="Gibbons, Carl" userId="d2b037bc-8fb4-4222-845c-61440543a456" providerId="ADAL" clId="{DD1CE632-2E50-4DF6-A094-0B92632EBA8E}" dt="2023-11-21T08:38:02.899" v="11" actId="20577"/>
+        <pc:chgData name="Gibbons, Carl" userId="d2b037bc-8fb4-4222-845c-61440543a456" providerId="ADAL" clId="{26C7F00A-80DD-401B-832B-E7EF202E28C2}" dt="2024-06-14T03:01:29.413" v="72" actId="20577"/>
         <pc:sldMkLst>
           <pc:docMk/>
-          <pc:sldMk cId="3594981681" sldId="272"/>
+          <pc:sldMk cId="3644072983" sldId="256"/>
         </pc:sldMkLst>
         <pc:spChg chg="mod">
-          <ac:chgData name="Gibbons, Carl" userId="d2b037bc-8fb4-4222-845c-61440543a456" providerId="ADAL" clId="{DD1CE632-2E50-4DF6-A094-0B92632EBA8E}" dt="2023-11-21T08:38:02.899" v="11" actId="20577"/>
-          <ac:spMkLst>
-            <pc:docMk/>
-            <pc:sldMk cId="3594981681" sldId="272"/>
+          <ac:chgData name="Gibbons, Carl" userId="d2b037bc-8fb4-4222-845c-61440543a456" providerId="ADAL" clId="{26C7F00A-80DD-401B-832B-E7EF202E28C2}" dt="2024-06-14T03:01:29.413" v="72" actId="20577"/>
+          <ac:spMkLst>
+            <pc:docMk/>
+            <pc:sldMk cId="3644072983" sldId="256"/>
+            <ac:spMk id="3" creationId="{8586CD17-5B17-5D66-987C-05DC748B3FF9}"/>
+          </ac:spMkLst>
+        </pc:spChg>
+      </pc:sldChg>
+      <pc:sldChg chg="addSp modSp mod">
+        <pc:chgData name="Gibbons, Carl" userId="d2b037bc-8fb4-4222-845c-61440543a456" providerId="ADAL" clId="{26C7F00A-80DD-401B-832B-E7EF202E28C2}" dt="2024-06-14T04:16:37.203" v="6124" actId="20577"/>
+        <pc:sldMkLst>
+          <pc:docMk/>
+          <pc:sldMk cId="2611413137" sldId="266"/>
+        </pc:sldMkLst>
+        <pc:spChg chg="mod">
+          <ac:chgData name="Gibbons, Carl" userId="d2b037bc-8fb4-4222-845c-61440543a456" providerId="ADAL" clId="{26C7F00A-80DD-401B-832B-E7EF202E28C2}" dt="2024-06-14T03:02:13.298" v="116" actId="20577"/>
+          <ac:spMkLst>
+            <pc:docMk/>
+            <pc:sldMk cId="2611413137" sldId="266"/>
+            <ac:spMk id="2" creationId="{64492E64-A68B-8CA7-B3C6-044F7C8E76AB}"/>
+          </ac:spMkLst>
+        </pc:spChg>
+        <pc:spChg chg="add mod">
+          <ac:chgData name="Gibbons, Carl" userId="d2b037bc-8fb4-4222-845c-61440543a456" providerId="ADAL" clId="{26C7F00A-80DD-401B-832B-E7EF202E28C2}" dt="2024-06-14T04:16:06.804" v="6121" actId="20577"/>
+          <ac:spMkLst>
+            <pc:docMk/>
+            <pc:sldMk cId="2611413137" sldId="266"/>
+            <ac:spMk id="3" creationId="{20E8B8C0-A2A5-7B62-1B40-D3BF6CA80A5C}"/>
+          </ac:spMkLst>
+        </pc:spChg>
+        <pc:spChg chg="mod">
+          <ac:chgData name="Gibbons, Carl" userId="d2b037bc-8fb4-4222-845c-61440543a456" providerId="ADAL" clId="{26C7F00A-80DD-401B-832B-E7EF202E28C2}" dt="2024-06-14T04:13:37.754" v="6102" actId="20577"/>
+          <ac:spMkLst>
+            <pc:docMk/>
+            <pc:sldMk cId="2611413137" sldId="266"/>
             <ac:spMk id="4" creationId="{B64A8207-997F-319E-7F6D-676D3ECA779B}"/>
+          </ac:spMkLst>
+        </pc:spChg>
+        <pc:spChg chg="add mod">
+          <ac:chgData name="Gibbons, Carl" userId="d2b037bc-8fb4-4222-845c-61440543a456" providerId="ADAL" clId="{26C7F00A-80DD-401B-832B-E7EF202E28C2}" dt="2024-06-14T04:16:37.203" v="6124" actId="20577"/>
+          <ac:spMkLst>
+            <pc:docMk/>
+            <pc:sldMk cId="2611413137" sldId="266"/>
+            <ac:spMk id="5" creationId="{EDDCCECA-E971-2EC4-FEF0-DCF50F49CE6A}"/>
+          </ac:spMkLst>
+        </pc:spChg>
+        <pc:spChg chg="add mod">
+          <ac:chgData name="Gibbons, Carl" userId="d2b037bc-8fb4-4222-845c-61440543a456" providerId="ADAL" clId="{26C7F00A-80DD-401B-832B-E7EF202E28C2}" dt="2024-06-14T04:12:29.809" v="6069" actId="1076"/>
+          <ac:spMkLst>
+            <pc:docMk/>
+            <pc:sldMk cId="2611413137" sldId="266"/>
+            <ac:spMk id="6" creationId="{BAACEC6C-4A35-E101-5EBD-12F9722B023B}"/>
           </ac:spMkLst>
         </pc:spChg>
       </pc:sldChg>
       <pc:sldChg chg="modSp mod">
-        <pc:chgData name="Gibbons, Carl" userId="d2b037bc-8fb4-4222-845c-61440543a456" providerId="ADAL" clId="{DD1CE632-2E50-4DF6-A094-0B92632EBA8E}" dt="2023-12-06T17:42:28.848" v="23" actId="20577"/>
+        <pc:chgData name="Gibbons, Carl" userId="d2b037bc-8fb4-4222-845c-61440543a456" providerId="ADAL" clId="{26C7F00A-80DD-401B-832B-E7EF202E28C2}" dt="2024-06-14T03:45:35.713" v="3519" actId="20577"/>
         <pc:sldMkLst>
           <pc:docMk/>
-          <pc:sldMk cId="1865769485" sldId="273"/>
+          <pc:sldMk cId="4188996306" sldId="267"/>
         </pc:sldMkLst>
         <pc:spChg chg="mod">
-          <ac:chgData name="Gibbons, Carl" userId="d2b037bc-8fb4-4222-845c-61440543a456" providerId="ADAL" clId="{DD1CE632-2E50-4DF6-A094-0B92632EBA8E}" dt="2023-12-06T17:42:28.848" v="23" actId="20577"/>
-          <ac:spMkLst>
-            <pc:docMk/>
-            <pc:sldMk cId="1865769485" sldId="273"/>
+          <ac:chgData name="Gibbons, Carl" userId="d2b037bc-8fb4-4222-845c-61440543a456" providerId="ADAL" clId="{26C7F00A-80DD-401B-832B-E7EF202E28C2}" dt="2024-06-14T03:32:32.285" v="2957" actId="20577"/>
+          <ac:spMkLst>
+            <pc:docMk/>
+            <pc:sldMk cId="4188996306" sldId="267"/>
+            <ac:spMk id="2" creationId="{64492E64-A68B-8CA7-B3C6-044F7C8E76AB}"/>
+          </ac:spMkLst>
+        </pc:spChg>
+        <pc:spChg chg="mod">
+          <ac:chgData name="Gibbons, Carl" userId="d2b037bc-8fb4-4222-845c-61440543a456" providerId="ADAL" clId="{26C7F00A-80DD-401B-832B-E7EF202E28C2}" dt="2024-06-14T03:45:35.713" v="3519" actId="20577"/>
+          <ac:spMkLst>
+            <pc:docMk/>
+            <pc:sldMk cId="4188996306" sldId="267"/>
             <ac:spMk id="4" creationId="{B64A8207-997F-319E-7F6D-676D3ECA779B}"/>
           </ac:spMkLst>
         </pc:spChg>
+      </pc:sldChg>
+      <pc:sldChg chg="del">
+        <pc:chgData name="Gibbons, Carl" userId="d2b037bc-8fb4-4222-845c-61440543a456" providerId="ADAL" clId="{26C7F00A-80DD-401B-832B-E7EF202E28C2}" dt="2024-06-14T03:32:17.349" v="2943" actId="47"/>
+        <pc:sldMkLst>
+          <pc:docMk/>
+          <pc:sldMk cId="2948456625" sldId="277"/>
+        </pc:sldMkLst>
+      </pc:sldChg>
+      <pc:sldChg chg="del">
+        <pc:chgData name="Gibbons, Carl" userId="d2b037bc-8fb4-4222-845c-61440543a456" providerId="ADAL" clId="{26C7F00A-80DD-401B-832B-E7EF202E28C2}" dt="2024-06-14T03:02:04.454" v="73" actId="47"/>
+        <pc:sldMkLst>
+          <pc:docMk/>
+          <pc:sldMk cId="102374663" sldId="278"/>
+        </pc:sldMkLst>
+      </pc:sldChg>
+      <pc:sldChg chg="del">
+        <pc:chgData name="Gibbons, Carl" userId="d2b037bc-8fb4-4222-845c-61440543a456" providerId="ADAL" clId="{26C7F00A-80DD-401B-832B-E7EF202E28C2}" dt="2024-06-14T03:53:53.417" v="4260" actId="47"/>
+        <pc:sldMkLst>
+          <pc:docMk/>
+          <pc:sldMk cId="1709941748" sldId="279"/>
+        </pc:sldMkLst>
+      </pc:sldChg>
+      <pc:sldChg chg="del">
+        <pc:chgData name="Gibbons, Carl" userId="d2b037bc-8fb4-4222-845c-61440543a456" providerId="ADAL" clId="{26C7F00A-80DD-401B-832B-E7EF202E28C2}" dt="2024-06-14T03:53:50.044" v="4259" actId="47"/>
+        <pc:sldMkLst>
+          <pc:docMk/>
+          <pc:sldMk cId="4176796158" sldId="280"/>
+        </pc:sldMkLst>
+      </pc:sldChg>
+      <pc:sldChg chg="del">
+        <pc:chgData name="Gibbons, Carl" userId="d2b037bc-8fb4-4222-845c-61440543a456" providerId="ADAL" clId="{26C7F00A-80DD-401B-832B-E7EF202E28C2}" dt="2024-06-14T03:53:48.385" v="4257" actId="47"/>
+        <pc:sldMkLst>
+          <pc:docMk/>
+          <pc:sldMk cId="3311622519" sldId="281"/>
+        </pc:sldMkLst>
+      </pc:sldChg>
+      <pc:sldChg chg="del">
+        <pc:chgData name="Gibbons, Carl" userId="d2b037bc-8fb4-4222-845c-61440543a456" providerId="ADAL" clId="{26C7F00A-80DD-401B-832B-E7EF202E28C2}" dt="2024-06-14T03:53:49.242" v="4258" actId="47"/>
+        <pc:sldMkLst>
+          <pc:docMk/>
+          <pc:sldMk cId="4163349812" sldId="282"/>
+        </pc:sldMkLst>
+      </pc:sldChg>
+      <pc:sldChg chg="del">
+        <pc:chgData name="Gibbons, Carl" userId="d2b037bc-8fb4-4222-845c-61440543a456" providerId="ADAL" clId="{26C7F00A-80DD-401B-832B-E7EF202E28C2}" dt="2024-06-14T03:53:47.016" v="4256" actId="47"/>
+        <pc:sldMkLst>
+          <pc:docMk/>
+          <pc:sldMk cId="2755793427" sldId="283"/>
+        </pc:sldMkLst>
       </pc:sldChg>
       <pc:sldChg chg="modSp mod">
-        <pc:chgData name="Gibbons, Carl" userId="d2b037bc-8fb4-4222-845c-61440543a456" providerId="ADAL" clId="{DD1CE632-2E50-4DF6-A094-0B92632EBA8E}" dt="2023-12-06T17:39:43.190" v="12" actId="20577"/>
+        <pc:chgData name="Gibbons, Carl" userId="d2b037bc-8fb4-4222-845c-61440543a456" providerId="ADAL" clId="{26C7F00A-80DD-401B-832B-E7EF202E28C2}" dt="2024-06-14T04:20:29.253" v="6160" actId="20577"/>
         <pc:sldMkLst>
           <pc:docMk/>
-          <pc:sldMk cId="3809967197" sldId="275"/>
+          <pc:sldMk cId="322366662" sldId="284"/>
         </pc:sldMkLst>
         <pc:spChg chg="mod">
-          <ac:chgData name="Gibbons, Carl" userId="d2b037bc-8fb4-4222-845c-61440543a456" providerId="ADAL" clId="{DD1CE632-2E50-4DF6-A094-0B92632EBA8E}" dt="2023-12-06T17:39:43.190" v="12" actId="20577"/>
-          <ac:spMkLst>
-            <pc:docMk/>
-            <pc:sldMk cId="3809967197" sldId="275"/>
-            <ac:spMk id="3" creationId="{ADD8957C-88E6-A920-4979-2BDA9406B518}"/>
+          <ac:chgData name="Gibbons, Carl" userId="d2b037bc-8fb4-4222-845c-61440543a456" providerId="ADAL" clId="{26C7F00A-80DD-401B-832B-E7EF202E28C2}" dt="2024-06-14T04:10:42.746" v="6042" actId="20577"/>
+          <ac:spMkLst>
+            <pc:docMk/>
+            <pc:sldMk cId="322366662" sldId="284"/>
+            <ac:spMk id="2" creationId="{64492E64-A68B-8CA7-B3C6-044F7C8E76AB}"/>
+          </ac:spMkLst>
+        </pc:spChg>
+        <pc:spChg chg="mod">
+          <ac:chgData name="Gibbons, Carl" userId="d2b037bc-8fb4-4222-845c-61440543a456" providerId="ADAL" clId="{26C7F00A-80DD-401B-832B-E7EF202E28C2}" dt="2024-06-14T04:20:29.253" v="6160" actId="20577"/>
+          <ac:spMkLst>
+            <pc:docMk/>
+            <pc:sldMk cId="322366662" sldId="284"/>
+            <ac:spMk id="4" creationId="{B64A8207-997F-319E-7F6D-676D3ECA779B}"/>
           </ac:spMkLst>
         </pc:spChg>
       </pc:sldChg>
-      <pc:sldChg chg="modSp mod">
-        <pc:chgData name="Gibbons, Carl" userId="d2b037bc-8fb4-4222-845c-61440543a456" providerId="ADAL" clId="{DD1CE632-2E50-4DF6-A094-0B92632EBA8E}" dt="2023-12-06T17:40:27.333" v="15" actId="20577"/>
+      <pc:sldChg chg="modSp add mod">
+        <pc:chgData name="Gibbons, Carl" userId="d2b037bc-8fb4-4222-845c-61440543a456" providerId="ADAL" clId="{26C7F00A-80DD-401B-832B-E7EF202E28C2}" dt="2024-06-14T04:25:56.561" v="6285" actId="20577"/>
         <pc:sldMkLst>
           <pc:docMk/>
-          <pc:sldMk cId="1742169507" sldId="276"/>
+          <pc:sldMk cId="2432840855" sldId="285"/>
         </pc:sldMkLst>
         <pc:spChg chg="mod">
-          <ac:chgData name="Gibbons, Carl" userId="d2b037bc-8fb4-4222-845c-61440543a456" providerId="ADAL" clId="{DD1CE632-2E50-4DF6-A094-0B92632EBA8E}" dt="2023-12-06T17:40:27.333" v="15" actId="20577"/>
-          <ac:spMkLst>
-            <pc:docMk/>
-            <pc:sldMk cId="1742169507" sldId="276"/>
-            <ac:spMk id="3" creationId="{ADD8957C-88E6-A920-4979-2BDA9406B518}"/>
+          <ac:chgData name="Gibbons, Carl" userId="d2b037bc-8fb4-4222-845c-61440543a456" providerId="ADAL" clId="{26C7F00A-80DD-401B-832B-E7EF202E28C2}" dt="2024-06-14T03:44:30.748" v="3459" actId="20577"/>
+          <ac:spMkLst>
+            <pc:docMk/>
+            <pc:sldMk cId="2432840855" sldId="285"/>
+            <ac:spMk id="2" creationId="{64492E64-A68B-8CA7-B3C6-044F7C8E76AB}"/>
+          </ac:spMkLst>
+        </pc:spChg>
+        <pc:spChg chg="mod">
+          <ac:chgData name="Gibbons, Carl" userId="d2b037bc-8fb4-4222-845c-61440543a456" providerId="ADAL" clId="{26C7F00A-80DD-401B-832B-E7EF202E28C2}" dt="2024-06-14T04:25:56.561" v="6285" actId="20577"/>
+          <ac:spMkLst>
+            <pc:docMk/>
+            <pc:sldMk cId="2432840855" sldId="285"/>
+            <ac:spMk id="4" creationId="{B64A8207-997F-319E-7F6D-676D3ECA779B}"/>
+          </ac:spMkLst>
+        </pc:spChg>
+      </pc:sldChg>
+      <pc:sldChg chg="modSp add mod">
+        <pc:chgData name="Gibbons, Carl" userId="d2b037bc-8fb4-4222-845c-61440543a456" providerId="ADAL" clId="{26C7F00A-80DD-401B-832B-E7EF202E28C2}" dt="2024-06-14T04:24:44.734" v="6236" actId="20577"/>
+        <pc:sldMkLst>
+          <pc:docMk/>
+          <pc:sldMk cId="2169521787" sldId="286"/>
+        </pc:sldMkLst>
+        <pc:spChg chg="mod">
+          <ac:chgData name="Gibbons, Carl" userId="d2b037bc-8fb4-4222-845c-61440543a456" providerId="ADAL" clId="{26C7F00A-80DD-401B-832B-E7EF202E28C2}" dt="2024-06-14T03:53:36.567" v="4255" actId="20577"/>
+          <ac:spMkLst>
+            <pc:docMk/>
+            <pc:sldMk cId="2169521787" sldId="286"/>
+            <ac:spMk id="2" creationId="{64492E64-A68B-8CA7-B3C6-044F7C8E76AB}"/>
+          </ac:spMkLst>
+        </pc:spChg>
+        <pc:spChg chg="mod">
+          <ac:chgData name="Gibbons, Carl" userId="d2b037bc-8fb4-4222-845c-61440543a456" providerId="ADAL" clId="{26C7F00A-80DD-401B-832B-E7EF202E28C2}" dt="2024-06-14T04:24:44.734" v="6236" actId="20577"/>
+          <ac:spMkLst>
+            <pc:docMk/>
+            <pc:sldMk cId="2169521787" sldId="286"/>
+            <ac:spMk id="4" creationId="{B64A8207-997F-319E-7F6D-676D3ECA779B}"/>
           </ac:spMkLst>
         </pc:spChg>
       </pc:sldChg>
@@ -1570,7 +1570,7 @@
           <a:p>
             <a:fld id="{0D69348B-4620-44E9-BF3F-EACBA9EEF323}" type="datetimeFigureOut">
               <a:rPr lang="en-US" smtClean="0"/>
-              <a:t>6/25/2024</a:t>
+              <a:t>11/26/2024</a:t>
             </a:fld>
             <a:endParaRPr lang="en-US"/>
           </a:p>
@@ -1982,7 +1982,7 @@
           <a:p>
             <a:fld id="{0D69348B-4620-44E9-BF3F-EACBA9EEF323}" type="datetimeFigureOut">
               <a:rPr lang="en-US" smtClean="0"/>
-              <a:t>6/25/2024</a:t>
+              <a:t>11/26/2024</a:t>
             </a:fld>
             <a:endParaRPr lang="en-US"/>
           </a:p>
@@ -2123,7 +2123,7 @@
           <a:p>
             <a:fld id="{0D69348B-4620-44E9-BF3F-EACBA9EEF323}" type="datetimeFigureOut">
               <a:rPr lang="en-US" smtClean="0"/>
-              <a:t>6/25/2024</a:t>
+              <a:t>11/26/2024</a:t>
             </a:fld>
             <a:endParaRPr lang="en-US"/>
           </a:p>
@@ -2236,7 +2236,7 @@
           <a:p>
             <a:fld id="{0D69348B-4620-44E9-BF3F-EACBA9EEF323}" type="datetimeFigureOut">
               <a:rPr lang="en-US" smtClean="0"/>
-              <a:t>6/25/2024</a:t>
+              <a:t>11/26/2024</a:t>
             </a:fld>
             <a:endParaRPr lang="en-US"/>
           </a:p>
@@ -2547,7 +2547,7 @@
           <a:p>
             <a:fld id="{0D69348B-4620-44E9-BF3F-EACBA9EEF323}" type="datetimeFigureOut">
               <a:rPr lang="en-US" smtClean="0"/>
-              <a:t>6/25/2024</a:t>
+              <a:t>11/26/2024</a:t>
             </a:fld>
             <a:endParaRPr lang="en-US"/>
           </a:p>
@@ -2835,7 +2835,7 @@
           <a:p>
             <a:fld id="{0D69348B-4620-44E9-BF3F-EACBA9EEF323}" type="datetimeFigureOut">
               <a:rPr lang="en-US" smtClean="0"/>
-              <a:t>6/25/2024</a:t>
+              <a:t>11/26/2024</a:t>
             </a:fld>
             <a:endParaRPr lang="en-US"/>
           </a:p>
@@ -3033,7 +3033,7 @@
           <a:p>
             <a:fld id="{0D69348B-4620-44E9-BF3F-EACBA9EEF323}" type="datetimeFigureOut">
               <a:rPr lang="en-US" smtClean="0"/>
-              <a:t>6/25/2024</a:t>
+              <a:t>11/26/2024</a:t>
             </a:fld>
             <a:endParaRPr lang="en-US"/>
           </a:p>
@@ -3241,7 +3241,7 @@
           <a:p>
             <a:fld id="{0D69348B-4620-44E9-BF3F-EACBA9EEF323}" type="datetimeFigureOut">
               <a:rPr lang="en-US" smtClean="0"/>
-              <a:t>6/25/2024</a:t>
+              <a:t>11/26/2024</a:t>
             </a:fld>
             <a:endParaRPr lang="en-US"/>
           </a:p>
@@ -3740,7 +3740,7 @@
           <a:p>
             <a:fld id="{0BE24BAF-58C0-4D38-ABA0-4170CC92DC13}" type="datetimeFigureOut">
               <a:rPr lang="en-US" smtClean="0"/>
-              <a:t>6/25/2024</a:t>
+              <a:t>11/26/2024</a:t>
             </a:fld>
             <a:endParaRPr lang="en-US"/>
           </a:p>
@@ -4041,7 +4041,7 @@
           <a:p>
             <a:fld id="{0BE24BAF-58C0-4D38-ABA0-4170CC92DC13}" type="datetimeFigureOut">
               <a:rPr lang="en-US" smtClean="0"/>
-              <a:t>6/25/2024</a:t>
+              <a:t>11/26/2024</a:t>
             </a:fld>
             <a:endParaRPr lang="en-US"/>
           </a:p>
@@ -4239,7 +4239,7 @@
           <a:p>
             <a:fld id="{0D69348B-4620-44E9-BF3F-EACBA9EEF323}" type="datetimeFigureOut">
               <a:rPr lang="en-US" smtClean="0"/>
-              <a:t>6/25/2024</a:t>
+              <a:t>11/26/2024</a:t>
             </a:fld>
             <a:endParaRPr lang="en-US"/>
           </a:p>
@@ -4514,7 +4514,7 @@
           <a:p>
             <a:fld id="{0D69348B-4620-44E9-BF3F-EACBA9EEF323}" type="datetimeFigureOut">
               <a:rPr lang="en-US" smtClean="0"/>
-              <a:t>6/25/2024</a:t>
+              <a:t>11/26/2024</a:t>
             </a:fld>
             <a:endParaRPr lang="en-US"/>
           </a:p>
@@ -4646,14 +4646,14 @@
           </a:ln>
           <a:extLst>
             <a:ext uri="{909E8E84-426E-40dd-AFC4-6F175D3DCCD1}">
-              <a14:hiddenFill xmlns="" xmlns:a14="http://schemas.microsoft.com/office/drawing/2010/main">
+              <a14:hiddenFill xmlns:a14="http://schemas.microsoft.com/office/drawing/2010/main" xmlns="">
                 <a:solidFill>
                   <a:srgbClr val="FFFFFF"/>
                 </a:solidFill>
               </a14:hiddenFill>
             </a:ext>
             <a:ext uri="{91240B29-F687-4f45-9708-019B960494DF}">
-              <a14:hiddenLine xmlns="" xmlns:a14="http://schemas.microsoft.com/office/drawing/2010/main" w="9525">
+              <a14:hiddenLine xmlns:a14="http://schemas.microsoft.com/office/drawing/2010/main" xmlns="" w="9525">
                 <a:solidFill>
                   <a:srgbClr val="000000"/>
                 </a:solidFill>
@@ -5469,7 +5469,7 @@
           <a:p>
             <a:fld id="{0D69348B-4620-44E9-BF3F-EACBA9EEF323}" type="datetimeFigureOut">
               <a:rPr lang="en-US" smtClean="0"/>
-              <a:t>6/25/2024</a:t>
+              <a:t>11/26/2024</a:t>
             </a:fld>
             <a:endParaRPr lang="en-US"/>
           </a:p>
@@ -6045,17 +6045,20 @@
               <a:rPr lang="en-US" sz="1800" dirty="0">
                 <a:latin typeface="+mn-lt"/>
               </a:rPr>
-              <a:t>For your last exercise this week, you will write your own exercise, based on one of the Red Tam tasks in textbook chapter 8, to be shared later with </a:t>
+              <a:t>For your last exercise this week, you will write your own exercise, based on one of the </a:t>
             </a:r>
             <a:r>
               <a:rPr lang="en-US" sz="1800">
                 <a:latin typeface="+mn-lt"/>
               </a:rPr>
-              <a:t>your classmates.</a:t>
-            </a:r>
-            <a:endParaRPr lang="en-US" sz="1800" dirty="0">
-              <a:latin typeface="+mn-lt"/>
-            </a:endParaRPr>
+              <a:t>Red Team </a:t>
+            </a:r>
+            <a:r>
+              <a:rPr lang="en-US" sz="1800" dirty="0">
+                <a:latin typeface="+mn-lt"/>
+              </a:rPr>
+              <a:t>tasks in textbook chapter 8, to be shared later with your classmates.</a:t>
+            </a:r>
           </a:p>
         </p:txBody>
       </p:sp>

</xml_diff>